<commit_message>
fixed egg chicken probelm in slides
</commit_message>
<xml_diff>
--- a/Intro.pptx
+++ b/Intro.pptx
@@ -4549,7 +4549,7 @@
           <a:p>
             <a:fld id="{6315994C-DD30-4E43-B3D3-FD8225D233B5}" type="datetimeFigureOut">
               <a:rPr lang="en-US" smtClean="0"/>
-              <a:t>10/2/2020</a:t>
+              <a:t>10/3/2020</a:t>
             </a:fld>
             <a:endParaRPr lang="en-US"/>
           </a:p>
@@ -5748,7 +5748,7 @@
           <a:p>
             <a:fld id="{458389C9-C49E-4A2B-B675-A98BD14A26DC}" type="datetimeFigureOut">
               <a:rPr lang="en-US" smtClean="0"/>
-              <a:t>10/2/2020</a:t>
+              <a:t>10/3/2020</a:t>
             </a:fld>
             <a:endParaRPr lang="en-US"/>
           </a:p>
@@ -5911,7 +5911,7 @@
           <a:p>
             <a:fld id="{458389C9-C49E-4A2B-B675-A98BD14A26DC}" type="datetimeFigureOut">
               <a:rPr lang="en-US" smtClean="0"/>
-              <a:t>10/2/2020</a:t>
+              <a:t>10/3/2020</a:t>
             </a:fld>
             <a:endParaRPr lang="en-US"/>
           </a:p>
@@ -6084,7 +6084,7 @@
           <a:p>
             <a:fld id="{458389C9-C49E-4A2B-B675-A98BD14A26DC}" type="datetimeFigureOut">
               <a:rPr lang="en-US" smtClean="0"/>
-              <a:t>10/2/2020</a:t>
+              <a:t>10/3/2020</a:t>
             </a:fld>
             <a:endParaRPr lang="en-US"/>
           </a:p>
@@ -6247,7 +6247,7 @@
           <a:p>
             <a:fld id="{458389C9-C49E-4A2B-B675-A98BD14A26DC}" type="datetimeFigureOut">
               <a:rPr lang="en-US" smtClean="0"/>
-              <a:t>10/2/2020</a:t>
+              <a:t>10/3/2020</a:t>
             </a:fld>
             <a:endParaRPr lang="en-US"/>
           </a:p>
@@ -6487,7 +6487,7 @@
           <a:p>
             <a:fld id="{458389C9-C49E-4A2B-B675-A98BD14A26DC}" type="datetimeFigureOut">
               <a:rPr lang="en-US" smtClean="0"/>
-              <a:t>10/2/2020</a:t>
+              <a:t>10/3/2020</a:t>
             </a:fld>
             <a:endParaRPr lang="en-US"/>
           </a:p>
@@ -6711,7 +6711,7 @@
           <a:p>
             <a:fld id="{458389C9-C49E-4A2B-B675-A98BD14A26DC}" type="datetimeFigureOut">
               <a:rPr lang="en-US" smtClean="0"/>
-              <a:t>10/2/2020</a:t>
+              <a:t>10/3/2020</a:t>
             </a:fld>
             <a:endParaRPr lang="en-US"/>
           </a:p>
@@ -7070,7 +7070,7 @@
           <a:p>
             <a:fld id="{458389C9-C49E-4A2B-B675-A98BD14A26DC}" type="datetimeFigureOut">
               <a:rPr lang="en-US" smtClean="0"/>
-              <a:t>10/2/2020</a:t>
+              <a:t>10/3/2020</a:t>
             </a:fld>
             <a:endParaRPr lang="en-US"/>
           </a:p>
@@ -7182,7 +7182,7 @@
           <a:p>
             <a:fld id="{458389C9-C49E-4A2B-B675-A98BD14A26DC}" type="datetimeFigureOut">
               <a:rPr lang="en-US" smtClean="0"/>
-              <a:t>10/2/2020</a:t>
+              <a:t>10/3/2020</a:t>
             </a:fld>
             <a:endParaRPr lang="en-US"/>
           </a:p>
@@ -7272,7 +7272,7 @@
           <a:p>
             <a:fld id="{458389C9-C49E-4A2B-B675-A98BD14A26DC}" type="datetimeFigureOut">
               <a:rPr lang="en-US" smtClean="0"/>
-              <a:t>10/2/2020</a:t>
+              <a:t>10/3/2020</a:t>
             </a:fld>
             <a:endParaRPr lang="en-US"/>
           </a:p>
@@ -7542,7 +7542,7 @@
           <a:p>
             <a:fld id="{458389C9-C49E-4A2B-B675-A98BD14A26DC}" type="datetimeFigureOut">
               <a:rPr lang="en-US" smtClean="0"/>
-              <a:t>10/2/2020</a:t>
+              <a:t>10/3/2020</a:t>
             </a:fld>
             <a:endParaRPr lang="en-US"/>
           </a:p>
@@ -7789,7 +7789,7 @@
           <a:p>
             <a:fld id="{458389C9-C49E-4A2B-B675-A98BD14A26DC}" type="datetimeFigureOut">
               <a:rPr lang="en-US" smtClean="0"/>
-              <a:t>10/2/2020</a:t>
+              <a:t>10/3/2020</a:t>
             </a:fld>
             <a:endParaRPr lang="en-US"/>
           </a:p>
@@ -7995,7 +7995,7 @@
           <a:p>
             <a:fld id="{458389C9-C49E-4A2B-B675-A98BD14A26DC}" type="datetimeFigureOut">
               <a:rPr lang="en-US" smtClean="0"/>
-              <a:t>10/2/2020</a:t>
+              <a:t>10/3/2020</a:t>
             </a:fld>
             <a:endParaRPr lang="en-US"/>
           </a:p>
@@ -11432,7 +11432,7 @@
         <p:spPr/>
         <p:txBody>
           <a:bodyPr>
-            <a:normAutofit fontScale="65000" lnSpcReduction="10000"/>
+            <a:normAutofit fontScale="65000" lnSpcReduction="20000"/>
           </a:bodyPr>
           <a:lstStyle/>
           <a:p>
@@ -11635,13 +11635,13 @@
           <a:p>
             <a:r>
               <a:rPr lang="en-US" altLang="zh-CN" dirty="0"/>
-              <a:t>Download material </a:t>
+              <a:t>Workshop material </a:t>
             </a:r>
             <a:r>
               <a:rPr lang="en-US" altLang="zh-CN" dirty="0">
                 <a:hlinkClick r:id="rId3"/>
               </a:rPr>
-              <a:t>here</a:t>
+              <a:t>https://github.com/senine/workshop</a:t>
             </a:r>
             <a:endParaRPr lang="en-US" altLang="zh-CN" dirty="0"/>
           </a:p>

</xml_diff>